<commit_message>
Organised and analysed measurements
</commit_message>
<xml_diff>
--- a/New measurements 20200108/WO3196/20191231 WO3196.pptx
+++ b/New measurements 20200108/WO3196/20191231 WO3196.pptx
@@ -10187,36 +10187,355 @@
             <p:ph idx="1"/>
           </p:nvPr>
         </p:nvSpPr>
-        <p:spPr/>
+        <p:spPr>
+          <a:xfrm>
+            <a:off x="503999" y="1326601"/>
+            <a:ext cx="9071640" cy="1630452"/>
+          </a:xfrm>
+        </p:spPr>
         <p:txBody>
           <a:bodyPr/>
           <a:lstStyle/>
           <a:p>
             <a:r>
-              <a:rPr lang="en-GB" sz="2400" dirty="0"/>
+              <a:rPr lang="en-GB" sz="1600" dirty="0"/>
               <a:t>Forward and backward configs have around the same noise (2E5 Ohm std)</a:t>
             </a:r>
           </a:p>
           <a:p>
             <a:r>
-              <a:rPr lang="en-GB" sz="2400" dirty="0"/>
+              <a:rPr lang="en-GB" sz="1600" dirty="0"/>
               <a:t>Measured resistance is way different. </a:t>
             </a:r>
           </a:p>
           <a:p>
             <a:r>
-              <a:rPr lang="en-GB" sz="2400" dirty="0"/>
-              <a:t>Forward measures 5.36E6 and backwards 3.70E6 Ohm.</a:t>
-            </a:r>
-          </a:p>
-          <a:p>
-            <a:r>
-              <a:rPr lang="en-GB" sz="2400" dirty="0"/>
+              <a:rPr lang="en-GB" sz="1600" dirty="0"/>
+              <a:t>Forward measures 5.36E6 and backwards -3.70E6 Ohm.</a:t>
+            </a:r>
+          </a:p>
+          <a:p>
+            <a:r>
+              <a:rPr lang="en-GB" sz="1600" dirty="0"/>
               <a:t>As forward is the default, I trust it more and will use that for the rest of the measurements</a:t>
             </a:r>
           </a:p>
         </p:txBody>
       </p:sp>
+      <p:grpSp>
+        <p:nvGrpSpPr>
+          <p:cNvPr id="19" name="Group 18">
+            <a:extLst>
+              <a:ext uri="{FF2B5EF4-FFF2-40B4-BE49-F238E27FC236}">
+                <a16:creationId xmlns:a16="http://schemas.microsoft.com/office/drawing/2014/main" id="{4F3E96B4-0700-4261-A38D-EFC7CBFC9B89}"/>
+              </a:ext>
+            </a:extLst>
+          </p:cNvPr>
+          <p:cNvGrpSpPr/>
+          <p:nvPr/>
+        </p:nvGrpSpPr>
+        <p:grpSpPr>
+          <a:xfrm>
+            <a:off x="57497" y="3156916"/>
+            <a:ext cx="5066074" cy="2204918"/>
+            <a:chOff x="57497" y="3156916"/>
+            <a:chExt cx="5066074" cy="2204918"/>
+          </a:xfrm>
+        </p:grpSpPr>
+        <p:pic>
+          <p:nvPicPr>
+            <p:cNvPr id="16" name="Picture 15" descr="A close up of a logo&#10;&#10;Description automatically generated">
+              <a:extLst>
+                <a:ext uri="{FF2B5EF4-FFF2-40B4-BE49-F238E27FC236}">
+                  <a16:creationId xmlns:a16="http://schemas.microsoft.com/office/drawing/2014/main" id="{D90297E1-9900-4B6A-8C12-A0AF5E2EFE96}"/>
+                </a:ext>
+              </a:extLst>
+            </p:cNvPr>
+            <p:cNvPicPr>
+              <a:picLocks noChangeAspect="1"/>
+            </p:cNvPicPr>
+            <p:nvPr/>
+          </p:nvPicPr>
+          <p:blipFill>
+            <a:blip r:embed="rId2">
+              <a:extLst>
+                <a:ext uri="{28A0092B-C50C-407E-A947-70E740481C1C}">
+                  <a14:useLocalDpi xmlns:a14="http://schemas.microsoft.com/office/drawing/2010/main" val="0"/>
+                </a:ext>
+              </a:extLst>
+            </a:blip>
+            <a:stretch>
+              <a:fillRect/>
+            </a:stretch>
+          </p:blipFill>
+          <p:spPr>
+            <a:xfrm>
+              <a:off x="57497" y="3384135"/>
+              <a:ext cx="2636931" cy="1977698"/>
+            </a:xfrm>
+            <a:prstGeom prst="rect">
+              <a:avLst/>
+            </a:prstGeom>
+          </p:spPr>
+        </p:pic>
+        <p:grpSp>
+          <p:nvGrpSpPr>
+            <p:cNvPr id="13" name="Group 12">
+              <a:extLst>
+                <a:ext uri="{FF2B5EF4-FFF2-40B4-BE49-F238E27FC236}">
+                  <a16:creationId xmlns:a16="http://schemas.microsoft.com/office/drawing/2014/main" id="{D2116270-D1D8-4665-AF66-7E000F67DCDB}"/>
+                </a:ext>
+              </a:extLst>
+            </p:cNvPr>
+            <p:cNvGrpSpPr/>
+            <p:nvPr/>
+          </p:nvGrpSpPr>
+          <p:grpSpPr>
+            <a:xfrm>
+              <a:off x="1524675" y="3156916"/>
+              <a:ext cx="3598896" cy="2204918"/>
+              <a:chOff x="5233538" y="2838781"/>
+              <a:chExt cx="4618385" cy="2642871"/>
+            </a:xfrm>
+          </p:grpSpPr>
+          <p:pic>
+            <p:nvPicPr>
+              <p:cNvPr id="5" name="Picture 4" descr="A close up of a logo&#10;&#10;Description automatically generated">
+                <a:extLst>
+                  <a:ext uri="{FF2B5EF4-FFF2-40B4-BE49-F238E27FC236}">
+                    <a16:creationId xmlns:a16="http://schemas.microsoft.com/office/drawing/2014/main" id="{1B84D590-8FE1-41C1-8816-D0E0B72797AD}"/>
+                  </a:ext>
+                </a:extLst>
+              </p:cNvPr>
+              <p:cNvPicPr>
+                <a:picLocks noChangeAspect="1"/>
+              </p:cNvPicPr>
+              <p:nvPr/>
+            </p:nvPicPr>
+            <p:blipFill>
+              <a:blip r:embed="rId3">
+                <a:extLst>
+                  <a:ext uri="{28A0092B-C50C-407E-A947-70E740481C1C}">
+                    <a14:useLocalDpi xmlns:a14="http://schemas.microsoft.com/office/drawing/2010/main" val="0"/>
+                  </a:ext>
+                </a:extLst>
+              </a:blip>
+              <a:stretch>
+                <a:fillRect/>
+              </a:stretch>
+            </p:blipFill>
+            <p:spPr>
+              <a:xfrm>
+                <a:off x="6691233" y="3111134"/>
+                <a:ext cx="3160690" cy="2370518"/>
+              </a:xfrm>
+              <a:prstGeom prst="rect">
+                <a:avLst/>
+              </a:prstGeom>
+            </p:spPr>
+          </p:pic>
+          <p:sp>
+            <p:nvSpPr>
+              <p:cNvPr id="8" name="Rectangle 7">
+                <a:extLst>
+                  <a:ext uri="{FF2B5EF4-FFF2-40B4-BE49-F238E27FC236}">
+                    <a16:creationId xmlns:a16="http://schemas.microsoft.com/office/drawing/2014/main" id="{82B47849-5259-4317-A692-ABBCFDB3DA3B}"/>
+                  </a:ext>
+                </a:extLst>
+              </p:cNvPr>
+              <p:cNvSpPr/>
+              <p:nvPr/>
+            </p:nvSpPr>
+            <p:spPr>
+              <a:xfrm>
+                <a:off x="5233538" y="2838781"/>
+                <a:ext cx="2752101" cy="369333"/>
+              </a:xfrm>
+              <a:prstGeom prst="rect">
+                <a:avLst/>
+              </a:prstGeom>
+            </p:spPr>
+            <p:txBody>
+              <a:bodyPr wrap="none">
+                <a:spAutoFit/>
+              </a:bodyPr>
+              <a:lstStyle/>
+              <a:p>
+                <a:r>
+                  <a:rPr lang="en-GB" dirty="0">
+                    <a:solidFill>
+                      <a:srgbClr val="000000"/>
+                    </a:solidFill>
+                    <a:latin typeface="Calibri" panose="020F0502020204030204" pitchFamily="34" charset="0"/>
+                  </a:rPr>
+                  <a:t>Forwards: Std = 0.021658</a:t>
+                </a:r>
+                <a:r>
+                  <a:rPr lang="en-GB" dirty="0"/>
+                  <a:t> V</a:t>
+                </a:r>
+              </a:p>
+            </p:txBody>
+          </p:sp>
+        </p:grpSp>
+      </p:grpSp>
+      <p:grpSp>
+        <p:nvGrpSpPr>
+          <p:cNvPr id="20" name="Group 19">
+            <a:extLst>
+              <a:ext uri="{FF2B5EF4-FFF2-40B4-BE49-F238E27FC236}">
+                <a16:creationId xmlns:a16="http://schemas.microsoft.com/office/drawing/2014/main" id="{85DC975E-4F6A-44F6-983F-6B18E38F3EE6}"/>
+              </a:ext>
+            </a:extLst>
+          </p:cNvPr>
+          <p:cNvGrpSpPr/>
+          <p:nvPr/>
+        </p:nvGrpSpPr>
+        <p:grpSpPr>
+          <a:xfrm>
+            <a:off x="4927960" y="3203667"/>
+            <a:ext cx="5040146" cy="2240802"/>
+            <a:chOff x="4927960" y="3203667"/>
+            <a:chExt cx="5040146" cy="2240802"/>
+          </a:xfrm>
+        </p:grpSpPr>
+        <p:pic>
+          <p:nvPicPr>
+            <p:cNvPr id="18" name="Picture 17" descr="A screenshot of a cell phone&#10;&#10;Description automatically generated">
+              <a:extLst>
+                <a:ext uri="{FF2B5EF4-FFF2-40B4-BE49-F238E27FC236}">
+                  <a16:creationId xmlns:a16="http://schemas.microsoft.com/office/drawing/2014/main" id="{916DEF71-DC46-4190-BAD3-D48988D51C28}"/>
+                </a:ext>
+              </a:extLst>
+            </p:cNvPr>
+            <p:cNvPicPr>
+              <a:picLocks noChangeAspect="1"/>
+            </p:cNvPicPr>
+            <p:nvPr/>
+          </p:nvPicPr>
+          <p:blipFill>
+            <a:blip r:embed="rId4">
+              <a:extLst>
+                <a:ext uri="{28A0092B-C50C-407E-A947-70E740481C1C}">
+                  <a14:useLocalDpi xmlns:a14="http://schemas.microsoft.com/office/drawing/2010/main" val="0"/>
+                </a:ext>
+              </a:extLst>
+            </a:blip>
+            <a:stretch>
+              <a:fillRect/>
+            </a:stretch>
+          </p:blipFill>
+          <p:spPr>
+            <a:xfrm>
+              <a:off x="4927960" y="3465046"/>
+              <a:ext cx="2462981" cy="1847235"/>
+            </a:xfrm>
+            <a:prstGeom prst="rect">
+              <a:avLst/>
+            </a:prstGeom>
+          </p:spPr>
+        </p:pic>
+        <p:grpSp>
+          <p:nvGrpSpPr>
+            <p:cNvPr id="14" name="Group 13">
+              <a:extLst>
+                <a:ext uri="{FF2B5EF4-FFF2-40B4-BE49-F238E27FC236}">
+                  <a16:creationId xmlns:a16="http://schemas.microsoft.com/office/drawing/2014/main" id="{B713B2A1-FCAB-470C-8246-00D99D0FA7A0}"/>
+                </a:ext>
+              </a:extLst>
+            </p:cNvPr>
+            <p:cNvGrpSpPr/>
+            <p:nvPr/>
+          </p:nvGrpSpPr>
+          <p:grpSpPr>
+            <a:xfrm>
+              <a:off x="6159450" y="3203667"/>
+              <a:ext cx="3808656" cy="2240802"/>
+              <a:chOff x="-198631" y="2835671"/>
+              <a:chExt cx="5141609" cy="2736777"/>
+            </a:xfrm>
+          </p:grpSpPr>
+          <p:pic>
+            <p:nvPicPr>
+              <p:cNvPr id="7" name="Picture 6" descr="A screenshot of a cell phone&#10;&#10;Description automatically generated">
+                <a:extLst>
+                  <a:ext uri="{FF2B5EF4-FFF2-40B4-BE49-F238E27FC236}">
+                    <a16:creationId xmlns:a16="http://schemas.microsoft.com/office/drawing/2014/main" id="{CBFB0B95-29F3-417C-A236-5F3FAF31B9F7}"/>
+                  </a:ext>
+                </a:extLst>
+              </p:cNvPr>
+              <p:cNvPicPr>
+                <a:picLocks noChangeAspect="1"/>
+              </p:cNvPicPr>
+              <p:nvPr/>
+            </p:nvPicPr>
+            <p:blipFill>
+              <a:blip r:embed="rId5">
+                <a:extLst>
+                  <a:ext uri="{28A0092B-C50C-407E-A947-70E740481C1C}">
+                    <a14:useLocalDpi xmlns:a14="http://schemas.microsoft.com/office/drawing/2010/main" val="0"/>
+                  </a:ext>
+                </a:extLst>
+              </a:blip>
+              <a:stretch>
+                <a:fillRect/>
+              </a:stretch>
+            </p:blipFill>
+            <p:spPr>
+              <a:xfrm>
+                <a:off x="1540165" y="3020338"/>
+                <a:ext cx="3402813" cy="2552110"/>
+              </a:xfrm>
+              <a:prstGeom prst="rect">
+                <a:avLst/>
+              </a:prstGeom>
+            </p:spPr>
+          </p:pic>
+          <p:sp>
+            <p:nvSpPr>
+              <p:cNvPr id="9" name="Rectangle 8">
+                <a:extLst>
+                  <a:ext uri="{FF2B5EF4-FFF2-40B4-BE49-F238E27FC236}">
+                    <a16:creationId xmlns:a16="http://schemas.microsoft.com/office/drawing/2014/main" id="{0890D23C-9E08-4526-91B5-0FD7DBC8FDF5}"/>
+                  </a:ext>
+                </a:extLst>
+              </p:cNvPr>
+              <p:cNvSpPr/>
+              <p:nvPr/>
+            </p:nvSpPr>
+            <p:spPr>
+              <a:xfrm>
+                <a:off x="-198631" y="2835671"/>
+                <a:ext cx="2936766" cy="369333"/>
+              </a:xfrm>
+              <a:prstGeom prst="rect">
+                <a:avLst/>
+              </a:prstGeom>
+            </p:spPr>
+            <p:txBody>
+              <a:bodyPr wrap="none">
+                <a:spAutoFit/>
+              </a:bodyPr>
+              <a:lstStyle/>
+              <a:p>
+                <a:r>
+                  <a:rPr lang="en-GB" dirty="0">
+                    <a:solidFill>
+                      <a:srgbClr val="000000"/>
+                    </a:solidFill>
+                    <a:latin typeface="Calibri" panose="020F0502020204030204" pitchFamily="34" charset="0"/>
+                  </a:rPr>
+                  <a:t>Backwards: Std = </a:t>
+                </a:r>
+                <a:r>
+                  <a:rPr lang="en-GB" dirty="0"/>
+                  <a:t>0.017153  V</a:t>
+                </a:r>
+              </a:p>
+            </p:txBody>
+          </p:sp>
+        </p:grpSp>
+      </p:grpSp>
     </p:spTree>
     <p:extLst>
       <p:ext uri="{BB962C8B-B14F-4D97-AF65-F5344CB8AC3E}">

</xml_diff>